<commit_message>
added lec 17 plus checklist added to readme
</commit_message>
<xml_diff>
--- a/lecture 16/Lecture 16 - Mobile Application Development.pptx
+++ b/lecture 16/Lecture 16 - Mobile Application Development.pptx
@@ -210,7 +210,7 @@
           <a:p>
             <a:fld id="{A3C2A6A4-4365-4DD8-8CB7-3A4F849F3EAA}" type="datetimeFigureOut">
               <a:rPr lang="en-GB" smtClean="0"/>
-              <a:t>11/12/2019</a:t>
+              <a:t>12/12/2019</a:t>
             </a:fld>
             <a:endParaRPr lang="en-GB"/>
           </a:p>
@@ -1988,7 +1988,7 @@
           <a:p>
             <a:fld id="{B5906FF8-4769-4691-A860-171D2AFB3E65}" type="datetimeFigureOut">
               <a:rPr lang="en-GB" smtClean="0"/>
-              <a:t>11/12/2019</a:t>
+              <a:t>12/12/2019</a:t>
             </a:fld>
             <a:endParaRPr lang="en-GB"/>
           </a:p>
@@ -2084,24 +2084,12 @@
   <p:clrMapOvr>
     <a:masterClrMapping/>
   </p:clrMapOvr>
-  <mc:AlternateContent xmlns:mc="http://schemas.openxmlformats.org/markup-compatibility/2006" xmlns:p14="http://schemas.microsoft.com/office/powerpoint/2010/main">
-    <mc:Choice Requires="p14">
-      <p:transition spd="slow" p14:dur="2000" advTm="5000">
-        <p:sndAc>
-          <p:stSnd>
-            <p:snd r:embed="rId1" name="drumroll.wav"/>
-          </p:stSnd>
-        </p:sndAc>
-      </p:transition>
+  <mc:AlternateContent xmlns:mc="http://schemas.openxmlformats.org/markup-compatibility/2006">
+    <mc:Choice xmlns:p14="http://schemas.microsoft.com/office/powerpoint/2010/main" Requires="p14">
+      <p:transition p14:dur="10" advClick="0" advTm="5000"/>
     </mc:Choice>
-    <mc:Fallback xmlns="">
-      <p:transition spd="slow" advTm="5000">
-        <p:sndAc>
-          <p:stSnd>
-            <p:snd r:embed="rId3" name="drumroll.wav"/>
-          </p:stSnd>
-        </p:sndAc>
-      </p:transition>
+    <mc:Fallback>
+      <p:transition advClick="0" advTm="5000"/>
     </mc:Fallback>
   </mc:AlternateContent>
 </p:sldLayout>
@@ -2216,7 +2204,7 @@
           <a:p>
             <a:fld id="{B5906FF8-4769-4691-A860-171D2AFB3E65}" type="datetimeFigureOut">
               <a:rPr lang="en-GB" smtClean="0"/>
-              <a:t>11/12/2019</a:t>
+              <a:t>12/12/2019</a:t>
             </a:fld>
             <a:endParaRPr lang="en-GB"/>
           </a:p>
@@ -2274,24 +2262,12 @@
   <p:clrMapOvr>
     <a:masterClrMapping/>
   </p:clrMapOvr>
-  <mc:AlternateContent xmlns:mc="http://schemas.openxmlformats.org/markup-compatibility/2006" xmlns:p14="http://schemas.microsoft.com/office/powerpoint/2010/main">
-    <mc:Choice Requires="p14">
-      <p:transition spd="slow" p14:dur="2000" advTm="5000">
-        <p:sndAc>
-          <p:stSnd>
-            <p:snd r:embed="rId1" name="drumroll.wav"/>
-          </p:stSnd>
-        </p:sndAc>
-      </p:transition>
+  <mc:AlternateContent xmlns:mc="http://schemas.openxmlformats.org/markup-compatibility/2006">
+    <mc:Choice xmlns:p14="http://schemas.microsoft.com/office/powerpoint/2010/main" Requires="p14">
+      <p:transition p14:dur="10" advClick="0" advTm="5000"/>
     </mc:Choice>
-    <mc:Fallback xmlns="">
-      <p:transition spd="slow" advTm="5000">
-        <p:sndAc>
-          <p:stSnd>
-            <p:snd r:embed="rId3" name="drumroll.wav"/>
-          </p:stSnd>
-        </p:sndAc>
-      </p:transition>
+    <mc:Fallback>
+      <p:transition advClick="0" advTm="5000"/>
     </mc:Fallback>
   </mc:AlternateContent>
 </p:sldLayout>
@@ -2492,7 +2468,7 @@
           <a:p>
             <a:fld id="{B5906FF8-4769-4691-A860-171D2AFB3E65}" type="datetimeFigureOut">
               <a:rPr lang="en-GB" smtClean="0"/>
-              <a:t>11/12/2019</a:t>
+              <a:t>12/12/2019</a:t>
             </a:fld>
             <a:endParaRPr lang="en-GB"/>
           </a:p>
@@ -2550,24 +2526,12 @@
   <p:clrMapOvr>
     <a:masterClrMapping/>
   </p:clrMapOvr>
-  <mc:AlternateContent xmlns:mc="http://schemas.openxmlformats.org/markup-compatibility/2006" xmlns:p14="http://schemas.microsoft.com/office/powerpoint/2010/main">
-    <mc:Choice Requires="p14">
-      <p:transition spd="slow" p14:dur="2000" advTm="5000">
-        <p:sndAc>
-          <p:stSnd>
-            <p:snd r:embed="rId1" name="drumroll.wav"/>
-          </p:stSnd>
-        </p:sndAc>
-      </p:transition>
+  <mc:AlternateContent xmlns:mc="http://schemas.openxmlformats.org/markup-compatibility/2006">
+    <mc:Choice xmlns:p14="http://schemas.microsoft.com/office/powerpoint/2010/main" Requires="p14">
+      <p:transition p14:dur="10" advClick="0" advTm="5000"/>
     </mc:Choice>
-    <mc:Fallback xmlns="">
-      <p:transition spd="slow" advTm="5000">
-        <p:sndAc>
-          <p:stSnd>
-            <p:snd r:embed="rId3" name="drumroll.wav"/>
-          </p:stSnd>
-        </p:sndAc>
-      </p:transition>
+    <mc:Fallback>
+      <p:transition advClick="0" advTm="5000"/>
     </mc:Fallback>
   </mc:AlternateContent>
 </p:sldLayout>
@@ -2686,7 +2650,7 @@
           <a:p>
             <a:fld id="{B5906FF8-4769-4691-A860-171D2AFB3E65}" type="datetimeFigureOut">
               <a:rPr lang="en-GB" smtClean="0"/>
-              <a:t>11/12/2019</a:t>
+              <a:t>12/12/2019</a:t>
             </a:fld>
             <a:endParaRPr lang="en-GB"/>
           </a:p>
@@ -2744,24 +2708,12 @@
   <p:clrMapOvr>
     <a:masterClrMapping/>
   </p:clrMapOvr>
-  <mc:AlternateContent xmlns:mc="http://schemas.openxmlformats.org/markup-compatibility/2006" xmlns:p14="http://schemas.microsoft.com/office/powerpoint/2010/main">
-    <mc:Choice Requires="p14">
-      <p:transition spd="slow" p14:dur="2000" advTm="5000">
-        <p:sndAc>
-          <p:stSnd>
-            <p:snd r:embed="rId1" name="drumroll.wav"/>
-          </p:stSnd>
-        </p:sndAc>
-      </p:transition>
+  <mc:AlternateContent xmlns:mc="http://schemas.openxmlformats.org/markup-compatibility/2006">
+    <mc:Choice xmlns:p14="http://schemas.microsoft.com/office/powerpoint/2010/main" Requires="p14">
+      <p:transition p14:dur="10" advClick="0" advTm="5000"/>
     </mc:Choice>
-    <mc:Fallback xmlns="">
-      <p:transition spd="slow" advTm="5000">
-        <p:sndAc>
-          <p:stSnd>
-            <p:snd r:embed="rId3" name="drumroll.wav"/>
-          </p:stSnd>
-        </p:sndAc>
-      </p:transition>
+    <mc:Fallback>
+      <p:transition advClick="0" advTm="5000"/>
     </mc:Fallback>
   </mc:AlternateContent>
 </p:sldLayout>
@@ -3049,7 +3001,7 @@
           <a:p>
             <a:fld id="{B5906FF8-4769-4691-A860-171D2AFB3E65}" type="datetimeFigureOut">
               <a:rPr lang="en-GB" smtClean="0"/>
-              <a:t>11/12/2019</a:t>
+              <a:t>12/12/2019</a:t>
             </a:fld>
             <a:endParaRPr lang="en-GB"/>
           </a:p>
@@ -3145,24 +3097,12 @@
   <p:clrMapOvr>
     <a:masterClrMapping/>
   </p:clrMapOvr>
-  <mc:AlternateContent xmlns:mc="http://schemas.openxmlformats.org/markup-compatibility/2006" xmlns:p14="http://schemas.microsoft.com/office/powerpoint/2010/main">
-    <mc:Choice Requires="p14">
-      <p:transition spd="slow" p14:dur="2000" advTm="5000">
-        <p:sndAc>
-          <p:stSnd>
-            <p:snd r:embed="rId1" name="drumroll.wav"/>
-          </p:stSnd>
-        </p:sndAc>
-      </p:transition>
+  <mc:AlternateContent xmlns:mc="http://schemas.openxmlformats.org/markup-compatibility/2006">
+    <mc:Choice xmlns:p14="http://schemas.microsoft.com/office/powerpoint/2010/main" Requires="p14">
+      <p:transition p14:dur="10" advClick="0" advTm="5000"/>
     </mc:Choice>
-    <mc:Fallback xmlns="">
-      <p:transition spd="slow" advTm="5000">
-        <p:sndAc>
-          <p:stSnd>
-            <p:snd r:embed="rId3" name="drumroll.wav"/>
-          </p:stSnd>
-        </p:sndAc>
-      </p:transition>
+    <mc:Fallback>
+      <p:transition advClick="0" advTm="5000"/>
     </mc:Fallback>
   </mc:AlternateContent>
 </p:sldLayout>
@@ -3344,7 +3284,7 @@
           <a:p>
             <a:fld id="{B5906FF8-4769-4691-A860-171D2AFB3E65}" type="datetimeFigureOut">
               <a:rPr lang="en-GB" smtClean="0"/>
-              <a:t>11/12/2019</a:t>
+              <a:t>12/12/2019</a:t>
             </a:fld>
             <a:endParaRPr lang="en-GB"/>
           </a:p>
@@ -3402,24 +3342,12 @@
   <p:clrMapOvr>
     <a:masterClrMapping/>
   </p:clrMapOvr>
-  <mc:AlternateContent xmlns:mc="http://schemas.openxmlformats.org/markup-compatibility/2006" xmlns:p14="http://schemas.microsoft.com/office/powerpoint/2010/main">
-    <mc:Choice Requires="p14">
-      <p:transition spd="slow" p14:dur="2000" advTm="5000">
-        <p:sndAc>
-          <p:stSnd>
-            <p:snd r:embed="rId1" name="drumroll.wav"/>
-          </p:stSnd>
-        </p:sndAc>
-      </p:transition>
+  <mc:AlternateContent xmlns:mc="http://schemas.openxmlformats.org/markup-compatibility/2006">
+    <mc:Choice xmlns:p14="http://schemas.microsoft.com/office/powerpoint/2010/main" Requires="p14">
+      <p:transition p14:dur="10" advClick="0" advTm="5000"/>
     </mc:Choice>
-    <mc:Fallback xmlns="">
-      <p:transition spd="slow" advTm="5000">
-        <p:sndAc>
-          <p:stSnd>
-            <p:snd r:embed="rId3" name="drumroll.wav"/>
-          </p:stSnd>
-        </p:sndAc>
-      </p:transition>
+    <mc:Fallback>
+      <p:transition advClick="0" advTm="5000"/>
     </mc:Fallback>
   </mc:AlternateContent>
 </p:sldLayout>
@@ -3743,7 +3671,7 @@
           <a:p>
             <a:fld id="{B5906FF8-4769-4691-A860-171D2AFB3E65}" type="datetimeFigureOut">
               <a:rPr lang="en-GB" smtClean="0"/>
-              <a:t>11/12/2019</a:t>
+              <a:t>12/12/2019</a:t>
             </a:fld>
             <a:endParaRPr lang="en-GB"/>
           </a:p>
@@ -3801,24 +3729,12 @@
   <p:clrMapOvr>
     <a:masterClrMapping/>
   </p:clrMapOvr>
-  <mc:AlternateContent xmlns:mc="http://schemas.openxmlformats.org/markup-compatibility/2006" xmlns:p14="http://schemas.microsoft.com/office/powerpoint/2010/main">
-    <mc:Choice Requires="p14">
-      <p:transition spd="slow" p14:dur="2000" advTm="5000">
-        <p:sndAc>
-          <p:stSnd>
-            <p:snd r:embed="rId1" name="drumroll.wav"/>
-          </p:stSnd>
-        </p:sndAc>
-      </p:transition>
+  <mc:AlternateContent xmlns:mc="http://schemas.openxmlformats.org/markup-compatibility/2006">
+    <mc:Choice xmlns:p14="http://schemas.microsoft.com/office/powerpoint/2010/main" Requires="p14">
+      <p:transition p14:dur="10" advClick="0" advTm="5000"/>
     </mc:Choice>
-    <mc:Fallback xmlns="">
-      <p:transition spd="slow" advTm="5000">
-        <p:sndAc>
-          <p:stSnd>
-            <p:snd r:embed="rId3" name="drumroll.wav"/>
-          </p:stSnd>
-        </p:sndAc>
-      </p:transition>
+    <mc:Fallback>
+      <p:transition advClick="0" advTm="5000"/>
     </mc:Fallback>
   </mc:AlternateContent>
 </p:sldLayout>
@@ -3881,7 +3797,7 @@
           <a:p>
             <a:fld id="{B5906FF8-4769-4691-A860-171D2AFB3E65}" type="datetimeFigureOut">
               <a:rPr lang="en-GB" smtClean="0"/>
-              <a:t>11/12/2019</a:t>
+              <a:t>12/12/2019</a:t>
             </a:fld>
             <a:endParaRPr lang="en-GB"/>
           </a:p>
@@ -3939,24 +3855,12 @@
   <p:clrMapOvr>
     <a:masterClrMapping/>
   </p:clrMapOvr>
-  <mc:AlternateContent xmlns:mc="http://schemas.openxmlformats.org/markup-compatibility/2006" xmlns:p14="http://schemas.microsoft.com/office/powerpoint/2010/main">
-    <mc:Choice Requires="p14">
-      <p:transition spd="slow" p14:dur="2000" advTm="5000">
-        <p:sndAc>
-          <p:stSnd>
-            <p:snd r:embed="rId1" name="drumroll.wav"/>
-          </p:stSnd>
-        </p:sndAc>
-      </p:transition>
+  <mc:AlternateContent xmlns:mc="http://schemas.openxmlformats.org/markup-compatibility/2006">
+    <mc:Choice xmlns:p14="http://schemas.microsoft.com/office/powerpoint/2010/main" Requires="p14">
+      <p:transition p14:dur="10" advClick="0" advTm="5000"/>
     </mc:Choice>
-    <mc:Fallback xmlns="">
-      <p:transition spd="slow" advTm="5000">
-        <p:sndAc>
-          <p:stSnd>
-            <p:snd r:embed="rId3" name="drumroll.wav"/>
-          </p:stSnd>
-        </p:sndAc>
-      </p:transition>
+    <mc:Fallback>
+      <p:transition advClick="0" advTm="5000"/>
     </mc:Fallback>
   </mc:AlternateContent>
 </p:sldLayout>
@@ -4072,7 +3976,7 @@
           <a:p>
             <a:fld id="{B5906FF8-4769-4691-A860-171D2AFB3E65}" type="datetimeFigureOut">
               <a:rPr lang="en-GB" smtClean="0"/>
-              <a:t>11/12/2019</a:t>
+              <a:t>12/12/2019</a:t>
             </a:fld>
             <a:endParaRPr lang="en-GB"/>
           </a:p>
@@ -4138,24 +4042,12 @@
   <p:clrMapOvr>
     <a:masterClrMapping/>
   </p:clrMapOvr>
-  <mc:AlternateContent xmlns:mc="http://schemas.openxmlformats.org/markup-compatibility/2006" xmlns:p14="http://schemas.microsoft.com/office/powerpoint/2010/main">
-    <mc:Choice Requires="p14">
-      <p:transition spd="slow" p14:dur="2000" advTm="5000">
-        <p:sndAc>
-          <p:stSnd>
-            <p:snd r:embed="rId1" name="drumroll.wav"/>
-          </p:stSnd>
-        </p:sndAc>
-      </p:transition>
+  <mc:AlternateContent xmlns:mc="http://schemas.openxmlformats.org/markup-compatibility/2006">
+    <mc:Choice xmlns:p14="http://schemas.microsoft.com/office/powerpoint/2010/main" Requires="p14">
+      <p:transition p14:dur="10" advClick="0" advTm="5000"/>
     </mc:Choice>
-    <mc:Fallback xmlns="">
-      <p:transition spd="slow" advTm="5000">
-        <p:sndAc>
-          <p:stSnd>
-            <p:snd r:embed="rId3" name="drumroll.wav"/>
-          </p:stSnd>
-        </p:sndAc>
-      </p:transition>
+    <mc:Fallback>
+      <p:transition advClick="0" advTm="5000"/>
     </mc:Fallback>
   </mc:AlternateContent>
 </p:sldLayout>
@@ -4446,7 +4338,7 @@
           <a:p>
             <a:fld id="{B5906FF8-4769-4691-A860-171D2AFB3E65}" type="datetimeFigureOut">
               <a:rPr lang="en-GB" smtClean="0"/>
-              <a:t>11/12/2019</a:t>
+              <a:t>12/12/2019</a:t>
             </a:fld>
             <a:endParaRPr lang="en-GB"/>
           </a:p>
@@ -4525,24 +4417,12 @@
   <p:clrMapOvr>
     <a:masterClrMapping/>
   </p:clrMapOvr>
-  <mc:AlternateContent xmlns:mc="http://schemas.openxmlformats.org/markup-compatibility/2006" xmlns:p14="http://schemas.microsoft.com/office/powerpoint/2010/main">
-    <mc:Choice Requires="p14">
-      <p:transition spd="slow" p14:dur="2000" advTm="5000">
-        <p:sndAc>
-          <p:stSnd>
-            <p:snd r:embed="rId1" name="drumroll.wav"/>
-          </p:stSnd>
-        </p:sndAc>
-      </p:transition>
+  <mc:AlternateContent xmlns:mc="http://schemas.openxmlformats.org/markup-compatibility/2006">
+    <mc:Choice xmlns:p14="http://schemas.microsoft.com/office/powerpoint/2010/main" Requires="p14">
+      <p:transition p14:dur="10" advClick="0" advTm="5000"/>
     </mc:Choice>
-    <mc:Fallback xmlns="">
-      <p:transition spd="slow" advTm="5000">
-        <p:sndAc>
-          <p:stSnd>
-            <p:snd r:embed="rId3" name="drumroll.wav"/>
-          </p:stSnd>
-        </p:sndAc>
-      </p:transition>
+    <mc:Fallback>
+      <p:transition advClick="0" advTm="5000"/>
     </mc:Fallback>
   </mc:AlternateContent>
 </p:sldLayout>
@@ -4695,7 +4575,7 @@
             <a:ext cx="12191985" cy="4915076"/>
           </a:xfrm>
           <a:blipFill>
-            <a:blip r:embed="rId3"/>
+            <a:blip r:embed="rId2"/>
             <a:stretch>
               <a:fillRect/>
             </a:stretch>
@@ -4848,7 +4728,7 @@
           <a:p>
             <a:fld id="{B5906FF8-4769-4691-A860-171D2AFB3E65}" type="datetimeFigureOut">
               <a:rPr lang="en-GB" smtClean="0"/>
-              <a:t>11/12/2019</a:t>
+              <a:t>12/12/2019</a:t>
             </a:fld>
             <a:endParaRPr lang="en-GB"/>
           </a:p>
@@ -4906,24 +4786,12 @@
   <p:clrMapOvr>
     <a:masterClrMapping/>
   </p:clrMapOvr>
-  <mc:AlternateContent xmlns:mc="http://schemas.openxmlformats.org/markup-compatibility/2006" xmlns:p14="http://schemas.microsoft.com/office/powerpoint/2010/main">
-    <mc:Choice Requires="p14">
-      <p:transition spd="slow" p14:dur="2000" advTm="5000">
-        <p:sndAc>
-          <p:stSnd>
-            <p:snd r:embed="rId1" name="drumroll.wav"/>
-          </p:stSnd>
-        </p:sndAc>
-      </p:transition>
+  <mc:AlternateContent xmlns:mc="http://schemas.openxmlformats.org/markup-compatibility/2006">
+    <mc:Choice xmlns:p14="http://schemas.microsoft.com/office/powerpoint/2010/main" Requires="p14">
+      <p:transition p14:dur="10" advClick="0" advTm="5000"/>
     </mc:Choice>
-    <mc:Fallback xmlns="">
-      <p:transition spd="slow" advTm="5000">
-        <p:sndAc>
-          <p:stSnd>
-            <p:snd r:embed="rId4" name="drumroll.wav"/>
-          </p:stSnd>
-        </p:sndAc>
-      </p:transition>
+    <mc:Fallback>
+      <p:transition advClick="0" advTm="5000"/>
     </mc:Fallback>
   </mc:AlternateContent>
 </p:sldLayout>
@@ -5155,7 +5023,7 @@
           <a:p>
             <a:fld id="{B5906FF8-4769-4691-A860-171D2AFB3E65}" type="datetimeFigureOut">
               <a:rPr lang="en-GB" smtClean="0"/>
-              <a:t>11/12/2019</a:t>
+              <a:t>12/12/2019</a:t>
             </a:fld>
             <a:endParaRPr lang="en-GB"/>
           </a:p>
@@ -5294,24 +5162,12 @@
     <p:sldLayoutId id="2147483687" r:id="rId10"/>
     <p:sldLayoutId id="2147483688" r:id="rId11"/>
   </p:sldLayoutIdLst>
-  <mc:AlternateContent xmlns:mc="http://schemas.openxmlformats.org/markup-compatibility/2006" xmlns:p14="http://schemas.microsoft.com/office/powerpoint/2010/main">
-    <mc:Choice Requires="p14">
-      <p:transition spd="slow" p14:dur="2000" advTm="5000">
-        <p:sndAc>
-          <p:stSnd>
-            <p:snd r:embed="rId13" name="drumroll.wav"/>
-          </p:stSnd>
-        </p:sndAc>
-      </p:transition>
+  <mc:AlternateContent xmlns:mc="http://schemas.openxmlformats.org/markup-compatibility/2006">
+    <mc:Choice xmlns:p14="http://schemas.microsoft.com/office/powerpoint/2010/main" Requires="p14">
+      <p:transition p14:dur="10" advClick="0" advTm="5000"/>
     </mc:Choice>
-    <mc:Fallback xmlns="">
-      <p:transition spd="slow" advTm="5000">
-        <p:sndAc>
-          <p:stSnd>
-            <p:snd r:embed="rId14" name="drumroll.wav"/>
-          </p:stSnd>
-        </p:sndAc>
-      </p:transition>
+    <mc:Fallback>
+      <p:transition advClick="0" advTm="5000"/>
     </mc:Fallback>
   </mc:AlternateContent>
   <p:txStyles>
@@ -5772,10 +5628,10 @@
   </p:clrMapOvr>
   <mc:AlternateContent xmlns:mc="http://schemas.openxmlformats.org/markup-compatibility/2006">
     <mc:Choice xmlns:p14="http://schemas.microsoft.com/office/powerpoint/2010/main" Requires="p14">
-      <p:transition p14:dur="10" advClick="0" advTm="5000"/>
+      <p:transition p14:dur="10" advClick="0"/>
     </mc:Choice>
     <mc:Fallback>
-      <p:transition advClick="0" advTm="5000"/>
+      <p:transition advClick="0"/>
     </mc:Fallback>
   </mc:AlternateContent>
   <p:timing>
@@ -5947,10 +5803,10 @@
   </p:clrMapOvr>
   <mc:AlternateContent xmlns:mc="http://schemas.openxmlformats.org/markup-compatibility/2006">
     <mc:Choice xmlns:p14="http://schemas.microsoft.com/office/powerpoint/2010/main" Requires="p14">
-      <p:transition p14:dur="10" advClick="0" advTm="5000"/>
+      <p:transition p14:dur="10" advClick="0"/>
     </mc:Choice>
     <mc:Fallback>
-      <p:transition advClick="0" advTm="5000"/>
+      <p:transition advClick="0"/>
     </mc:Fallback>
   </mc:AlternateContent>
   <p:timing>
@@ -6097,10 +5953,10 @@
   </p:clrMapOvr>
   <mc:AlternateContent xmlns:mc="http://schemas.openxmlformats.org/markup-compatibility/2006">
     <mc:Choice xmlns:p14="http://schemas.microsoft.com/office/powerpoint/2010/main" Requires="p14">
-      <p:transition p14:dur="10" advClick="0" advTm="5000"/>
+      <p:transition p14:dur="10" advClick="0"/>
     </mc:Choice>
     <mc:Fallback>
-      <p:transition advClick="0" advTm="5000"/>
+      <p:transition advClick="0"/>
     </mc:Fallback>
   </mc:AlternateContent>
   <p:timing>
@@ -6266,10 +6122,10 @@
   </p:clrMapOvr>
   <mc:AlternateContent xmlns:mc="http://schemas.openxmlformats.org/markup-compatibility/2006">
     <mc:Choice xmlns:p14="http://schemas.microsoft.com/office/powerpoint/2010/main" Requires="p14">
-      <p:transition p14:dur="10" advClick="0" advTm="5000"/>
+      <p:transition p14:dur="10" advClick="0"/>
     </mc:Choice>
     <mc:Fallback>
-      <p:transition advClick="0" advTm="5000"/>
+      <p:transition advClick="0"/>
     </mc:Fallback>
   </mc:AlternateContent>
   <p:timing>
@@ -6473,10 +6329,10 @@
   </p:clrMapOvr>
   <mc:AlternateContent xmlns:mc="http://schemas.openxmlformats.org/markup-compatibility/2006">
     <mc:Choice xmlns:p14="http://schemas.microsoft.com/office/powerpoint/2010/main" Requires="p14">
-      <p:transition p14:dur="10" advClick="0" advTm="5000"/>
+      <p:transition p14:dur="10" advClick="0"/>
     </mc:Choice>
     <mc:Fallback>
-      <p:transition advClick="0" advTm="5000"/>
+      <p:transition advClick="0"/>
     </mc:Fallback>
   </mc:AlternateContent>
   <p:timing>
@@ -6627,10 +6483,10 @@
   </p:clrMapOvr>
   <mc:AlternateContent xmlns:mc="http://schemas.openxmlformats.org/markup-compatibility/2006">
     <mc:Choice xmlns:p14="http://schemas.microsoft.com/office/powerpoint/2010/main" Requires="p14">
-      <p:transition p14:dur="10" advClick="0" advTm="5000"/>
+      <p:transition p14:dur="10" advClick="0"/>
     </mc:Choice>
     <mc:Fallback>
-      <p:transition advClick="0" advTm="5000"/>
+      <p:transition advClick="0"/>
     </mc:Fallback>
   </mc:AlternateContent>
   <p:timing>
@@ -6791,10 +6647,10 @@
   </p:clrMapOvr>
   <mc:AlternateContent xmlns:mc="http://schemas.openxmlformats.org/markup-compatibility/2006">
     <mc:Choice xmlns:p14="http://schemas.microsoft.com/office/powerpoint/2010/main" Requires="p14">
-      <p:transition p14:dur="10" advClick="0" advTm="5000"/>
+      <p:transition p14:dur="10" advClick="0"/>
     </mc:Choice>
     <mc:Fallback>
-      <p:transition advClick="0" advTm="5000"/>
+      <p:transition advClick="0"/>
     </mc:Fallback>
   </mc:AlternateContent>
   <p:timing>
@@ -6960,10 +6816,10 @@
   </p:clrMapOvr>
   <mc:AlternateContent xmlns:mc="http://schemas.openxmlformats.org/markup-compatibility/2006">
     <mc:Choice xmlns:p14="http://schemas.microsoft.com/office/powerpoint/2010/main" Requires="p14">
-      <p:transition p14:dur="10" advClick="0" advTm="5000"/>
+      <p:transition p14:dur="10" advClick="0"/>
     </mc:Choice>
     <mc:Fallback>
-      <p:transition advClick="0" advTm="5000"/>
+      <p:transition advClick="0"/>
     </mc:Fallback>
   </mc:AlternateContent>
   <p:timing>
@@ -7108,10 +6964,10 @@
   </p:clrMapOvr>
   <mc:AlternateContent xmlns:mc="http://schemas.openxmlformats.org/markup-compatibility/2006">
     <mc:Choice xmlns:p14="http://schemas.microsoft.com/office/powerpoint/2010/main" Requires="p14">
-      <p:transition p14:dur="10" advClick="0" advTm="5000"/>
+      <p:transition p14:dur="10" advClick="0"/>
     </mc:Choice>
     <mc:Fallback>
-      <p:transition advClick="0" advTm="5000"/>
+      <p:transition advClick="0"/>
     </mc:Fallback>
   </mc:AlternateContent>
   <p:timing>
@@ -7254,10 +7110,10 @@
   </p:clrMapOvr>
   <mc:AlternateContent xmlns:mc="http://schemas.openxmlformats.org/markup-compatibility/2006">
     <mc:Choice xmlns:p14="http://schemas.microsoft.com/office/powerpoint/2010/main" Requires="p14">
-      <p:transition p14:dur="10" advClick="0" advTm="5000"/>
+      <p:transition p14:dur="10" advClick="0"/>
     </mc:Choice>
     <mc:Fallback>
-      <p:transition advClick="0" advTm="5000"/>
+      <p:transition advClick="0"/>
     </mc:Fallback>
   </mc:AlternateContent>
   <p:timing>
@@ -7410,10 +7266,10 @@
   </p:clrMapOvr>
   <mc:AlternateContent xmlns:mc="http://schemas.openxmlformats.org/markup-compatibility/2006">
     <mc:Choice xmlns:p14="http://schemas.microsoft.com/office/powerpoint/2010/main" Requires="p14">
-      <p:transition p14:dur="10" advClick="0" advTm="5000"/>
+      <p:transition p14:dur="10" advClick="0"/>
     </mc:Choice>
     <mc:Fallback>
-      <p:transition advClick="0" advTm="5000"/>
+      <p:transition advClick="0"/>
     </mc:Fallback>
   </mc:AlternateContent>
   <p:timing>
@@ -7540,10 +7396,10 @@
   </p:clrMapOvr>
   <mc:AlternateContent xmlns:mc="http://schemas.openxmlformats.org/markup-compatibility/2006">
     <mc:Choice xmlns:p14="http://schemas.microsoft.com/office/powerpoint/2010/main" Requires="p14">
-      <p:transition p14:dur="10" advClick="0" advTm="5000"/>
+      <p:transition p14:dur="10" advClick="0"/>
     </mc:Choice>
     <mc:Fallback>
-      <p:transition advClick="0" advTm="5000"/>
+      <p:transition advClick="0"/>
     </mc:Fallback>
   </mc:AlternateContent>
   <p:timing>
@@ -7647,11 +7503,7 @@
             </a:r>
             <a:r>
               <a:rPr lang="en-GB" dirty="0" smtClean="0"/>
-              <a:t>to </a:t>
-            </a:r>
-            <a:r>
-              <a:rPr lang="en-GB" dirty="0" smtClean="0"/>
-              <a:t>add more </a:t>
+              <a:t>to add more </a:t>
             </a:r>
             <a:r>
               <a:rPr lang="en-GB" dirty="0"/>
@@ -7689,10 +7541,10 @@
   </p:clrMapOvr>
   <mc:AlternateContent xmlns:mc="http://schemas.openxmlformats.org/markup-compatibility/2006">
     <mc:Choice xmlns:p14="http://schemas.microsoft.com/office/powerpoint/2010/main" Requires="p14">
-      <p:transition p14:dur="10" advClick="0" advTm="5000"/>
+      <p:transition p14:dur="10" advClick="0"/>
     </mc:Choice>
     <mc:Fallback>
-      <p:transition advClick="0" advTm="5000"/>
+      <p:transition advClick="0"/>
     </mc:Fallback>
   </mc:AlternateContent>
   <p:timing>

</xml_diff>